<commit_message>
Added content to Poster and fixed the design
</commit_message>
<xml_diff>
--- a/Presentations/Poster.pptx
+++ b/Presentations/Poster.pptx
@@ -4,6 +4,9 @@
   <p:sldMasterIdLst>
     <p:sldMasterId id="2147483648" r:id="rId1"/>
   </p:sldMasterIdLst>
+  <p:notesMasterIdLst>
+    <p:notesMasterId r:id="rId3"/>
+  </p:notesMasterIdLst>
   <p:sldIdLst>
     <p:sldId id="256" r:id="rId2"/>
   </p:sldIdLst>
@@ -13,7 +16,7 @@
     <a:defPPr>
       <a:defRPr lang="en-CY"/>
     </a:defPPr>
-    <a:lvl1pPr marL="0" algn="l" defTabSz="914400" rtl="0" eaLnBrk="1" latinLnBrk="0" hangingPunct="1">
+    <a:lvl1pPr marL="0" algn="l" defTabSz="914302" rtl="0" eaLnBrk="1" latinLnBrk="0" hangingPunct="1">
       <a:defRPr sz="1800" kern="1200">
         <a:solidFill>
           <a:schemeClr val="tx1"/>
@@ -23,7 +26,7 @@
         <a:cs typeface="+mn-cs"/>
       </a:defRPr>
     </a:lvl1pPr>
-    <a:lvl2pPr marL="457200" algn="l" defTabSz="914400" rtl="0" eaLnBrk="1" latinLnBrk="0" hangingPunct="1">
+    <a:lvl2pPr marL="457151" algn="l" defTabSz="914302" rtl="0" eaLnBrk="1" latinLnBrk="0" hangingPunct="1">
       <a:defRPr sz="1800" kern="1200">
         <a:solidFill>
           <a:schemeClr val="tx1"/>
@@ -33,7 +36,7 @@
         <a:cs typeface="+mn-cs"/>
       </a:defRPr>
     </a:lvl2pPr>
-    <a:lvl3pPr marL="914400" algn="l" defTabSz="914400" rtl="0" eaLnBrk="1" latinLnBrk="0" hangingPunct="1">
+    <a:lvl3pPr marL="914302" algn="l" defTabSz="914302" rtl="0" eaLnBrk="1" latinLnBrk="0" hangingPunct="1">
       <a:defRPr sz="1800" kern="1200">
         <a:solidFill>
           <a:schemeClr val="tx1"/>
@@ -43,7 +46,7 @@
         <a:cs typeface="+mn-cs"/>
       </a:defRPr>
     </a:lvl3pPr>
-    <a:lvl4pPr marL="1371600" algn="l" defTabSz="914400" rtl="0" eaLnBrk="1" latinLnBrk="0" hangingPunct="1">
+    <a:lvl4pPr marL="1371453" algn="l" defTabSz="914302" rtl="0" eaLnBrk="1" latinLnBrk="0" hangingPunct="1">
       <a:defRPr sz="1800" kern="1200">
         <a:solidFill>
           <a:schemeClr val="tx1"/>
@@ -53,7 +56,7 @@
         <a:cs typeface="+mn-cs"/>
       </a:defRPr>
     </a:lvl4pPr>
-    <a:lvl5pPr marL="1828800" algn="l" defTabSz="914400" rtl="0" eaLnBrk="1" latinLnBrk="0" hangingPunct="1">
+    <a:lvl5pPr marL="1828604" algn="l" defTabSz="914302" rtl="0" eaLnBrk="1" latinLnBrk="0" hangingPunct="1">
       <a:defRPr sz="1800" kern="1200">
         <a:solidFill>
           <a:schemeClr val="tx1"/>
@@ -63,7 +66,7 @@
         <a:cs typeface="+mn-cs"/>
       </a:defRPr>
     </a:lvl5pPr>
-    <a:lvl6pPr marL="2286000" algn="l" defTabSz="914400" rtl="0" eaLnBrk="1" latinLnBrk="0" hangingPunct="1">
+    <a:lvl6pPr marL="2285756" algn="l" defTabSz="914302" rtl="0" eaLnBrk="1" latinLnBrk="0" hangingPunct="1">
       <a:defRPr sz="1800" kern="1200">
         <a:solidFill>
           <a:schemeClr val="tx1"/>
@@ -73,7 +76,7 @@
         <a:cs typeface="+mn-cs"/>
       </a:defRPr>
     </a:lvl6pPr>
-    <a:lvl7pPr marL="2743200" algn="l" defTabSz="914400" rtl="0" eaLnBrk="1" latinLnBrk="0" hangingPunct="1">
+    <a:lvl7pPr marL="2742907" algn="l" defTabSz="914302" rtl="0" eaLnBrk="1" latinLnBrk="0" hangingPunct="1">
       <a:defRPr sz="1800" kern="1200">
         <a:solidFill>
           <a:schemeClr val="tx1"/>
@@ -83,7 +86,7 @@
         <a:cs typeface="+mn-cs"/>
       </a:defRPr>
     </a:lvl7pPr>
-    <a:lvl8pPr marL="3200400" algn="l" defTabSz="914400" rtl="0" eaLnBrk="1" latinLnBrk="0" hangingPunct="1">
+    <a:lvl8pPr marL="3200058" algn="l" defTabSz="914302" rtl="0" eaLnBrk="1" latinLnBrk="0" hangingPunct="1">
       <a:defRPr sz="1800" kern="1200">
         <a:solidFill>
           <a:schemeClr val="tx1"/>
@@ -93,7 +96,7 @@
         <a:cs typeface="+mn-cs"/>
       </a:defRPr>
     </a:lvl8pPr>
-    <a:lvl9pPr marL="3657600" algn="l" defTabSz="914400" rtl="0" eaLnBrk="1" latinLnBrk="0" hangingPunct="1">
+    <a:lvl9pPr marL="3657209" algn="l" defTabSz="914302" rtl="0" eaLnBrk="1" latinLnBrk="0" hangingPunct="1">
       <a:defRPr sz="1800" kern="1200">
         <a:solidFill>
           <a:schemeClr val="tx1"/>
@@ -104,7 +107,446 @@
       </a:defRPr>
     </a:lvl9pPr>
   </p:defaultTextStyle>
+  <p:extLst>
+    <p:ext uri="{EFAFB233-063F-42B5-8137-9DF3F51BA10A}">
+      <p15:sldGuideLst xmlns:p15="http://schemas.microsoft.com/office/powerpoint/2012/main"/>
+    </p:ext>
+  </p:extLst>
 </p:presentation>
+</file>
+
+<file path=ppt/notesMasters/notesMaster1.xml><?xml version="1.0" encoding="utf-8"?>
+<p:notesMaster xmlns:a="http://schemas.openxmlformats.org/drawingml/2006/main" xmlns:r="http://schemas.openxmlformats.org/officeDocument/2006/relationships" xmlns:p="http://schemas.openxmlformats.org/presentationml/2006/main">
+  <p:cSld>
+    <p:bg>
+      <p:bgRef idx="1001">
+        <a:schemeClr val="bg1"/>
+      </p:bgRef>
+    </p:bg>
+    <p:spTree>
+      <p:nvGrpSpPr>
+        <p:cNvPr id="1" name=""/>
+        <p:cNvGrpSpPr/>
+        <p:nvPr/>
+      </p:nvGrpSpPr>
+      <p:grpSpPr>
+        <a:xfrm>
+          <a:off x="0" y="0"/>
+          <a:ext cx="0" cy="0"/>
+          <a:chOff x="0" y="0"/>
+          <a:chExt cx="0" cy="0"/>
+        </a:xfrm>
+      </p:grpSpPr>
+      <p:sp>
+        <p:nvSpPr>
+          <p:cNvPr id="2" name="Header Placeholder 1"/>
+          <p:cNvSpPr>
+            <a:spLocks noGrp="1"/>
+          </p:cNvSpPr>
+          <p:nvPr>
+            <p:ph type="hdr" sz="quarter"/>
+          </p:nvPr>
+        </p:nvSpPr>
+        <p:spPr>
+          <a:xfrm>
+            <a:off x="0" y="0"/>
+            <a:ext cx="2971800" cy="458788"/>
+          </a:xfrm>
+          <a:prstGeom prst="rect">
+            <a:avLst/>
+          </a:prstGeom>
+        </p:spPr>
+        <p:txBody>
+          <a:bodyPr vert="horz" lIns="91440" tIns="45720" rIns="91440" bIns="45720" rtlCol="0"/>
+          <a:lstStyle>
+            <a:lvl1pPr algn="l">
+              <a:defRPr sz="1200"/>
+            </a:lvl1pPr>
+          </a:lstStyle>
+          <a:p>
+            <a:endParaRPr lang="en-CY"/>
+          </a:p>
+        </p:txBody>
+      </p:sp>
+      <p:sp>
+        <p:nvSpPr>
+          <p:cNvPr id="3" name="Date Placeholder 2"/>
+          <p:cNvSpPr>
+            <a:spLocks noGrp="1"/>
+          </p:cNvSpPr>
+          <p:nvPr>
+            <p:ph type="dt" idx="1"/>
+          </p:nvPr>
+        </p:nvSpPr>
+        <p:spPr>
+          <a:xfrm>
+            <a:off x="3884613" y="0"/>
+            <a:ext cx="2971800" cy="458788"/>
+          </a:xfrm>
+          <a:prstGeom prst="rect">
+            <a:avLst/>
+          </a:prstGeom>
+        </p:spPr>
+        <p:txBody>
+          <a:bodyPr vert="horz" lIns="91440" tIns="45720" rIns="91440" bIns="45720" rtlCol="0"/>
+          <a:lstStyle>
+            <a:lvl1pPr algn="r">
+              <a:defRPr sz="1200"/>
+            </a:lvl1pPr>
+          </a:lstStyle>
+          <a:p>
+            <a:fld id="{0FAE6238-A359-4B09-B230-3ECC1EBA8710}" type="datetimeFigureOut">
+              <a:rPr lang="en-CY" smtClean="0"/>
+              <a:t>18/04/2022</a:t>
+            </a:fld>
+            <a:endParaRPr lang="en-CY"/>
+          </a:p>
+        </p:txBody>
+      </p:sp>
+      <p:sp>
+        <p:nvSpPr>
+          <p:cNvPr id="4" name="Slide Image Placeholder 3"/>
+          <p:cNvSpPr>
+            <a:spLocks noGrp="1" noRot="1" noChangeAspect="1"/>
+          </p:cNvSpPr>
+          <p:nvPr>
+            <p:ph type="sldImg" idx="2"/>
+          </p:nvPr>
+        </p:nvSpPr>
+        <p:spPr>
+          <a:xfrm>
+            <a:off x="685800" y="1143000"/>
+            <a:ext cx="5486400" cy="3086100"/>
+          </a:xfrm>
+          <a:prstGeom prst="rect">
+            <a:avLst/>
+          </a:prstGeom>
+          <a:noFill/>
+          <a:ln w="12700">
+            <a:solidFill>
+              <a:prstClr val="black"/>
+            </a:solidFill>
+          </a:ln>
+        </p:spPr>
+        <p:txBody>
+          <a:bodyPr vert="horz" lIns="91440" tIns="45720" rIns="91440" bIns="45720" rtlCol="0" anchor="ctr"/>
+          <a:lstStyle/>
+          <a:p>
+            <a:endParaRPr lang="en-CY"/>
+          </a:p>
+        </p:txBody>
+      </p:sp>
+      <p:sp>
+        <p:nvSpPr>
+          <p:cNvPr id="5" name="Notes Placeholder 4"/>
+          <p:cNvSpPr>
+            <a:spLocks noGrp="1"/>
+          </p:cNvSpPr>
+          <p:nvPr>
+            <p:ph type="body" sz="quarter" idx="3"/>
+          </p:nvPr>
+        </p:nvSpPr>
+        <p:spPr>
+          <a:xfrm>
+            <a:off x="685800" y="4400550"/>
+            <a:ext cx="5486400" cy="3600450"/>
+          </a:xfrm>
+          <a:prstGeom prst="rect">
+            <a:avLst/>
+          </a:prstGeom>
+        </p:spPr>
+        <p:txBody>
+          <a:bodyPr vert="horz" lIns="91440" tIns="45720" rIns="91440" bIns="45720" rtlCol="0"/>
+          <a:lstStyle/>
+          <a:p>
+            <a:pPr lvl="0"/>
+            <a:r>
+              <a:rPr lang="en-US"/>
+              <a:t>Click to edit Master text styles</a:t>
+            </a:r>
+          </a:p>
+          <a:p>
+            <a:pPr lvl="1"/>
+            <a:r>
+              <a:rPr lang="en-US"/>
+              <a:t>Second level</a:t>
+            </a:r>
+          </a:p>
+          <a:p>
+            <a:pPr lvl="2"/>
+            <a:r>
+              <a:rPr lang="en-US"/>
+              <a:t>Third level</a:t>
+            </a:r>
+          </a:p>
+          <a:p>
+            <a:pPr lvl="3"/>
+            <a:r>
+              <a:rPr lang="en-US"/>
+              <a:t>Fourth level</a:t>
+            </a:r>
+          </a:p>
+          <a:p>
+            <a:pPr lvl="4"/>
+            <a:r>
+              <a:rPr lang="en-US"/>
+              <a:t>Fifth level</a:t>
+            </a:r>
+            <a:endParaRPr lang="en-CY"/>
+          </a:p>
+        </p:txBody>
+      </p:sp>
+      <p:sp>
+        <p:nvSpPr>
+          <p:cNvPr id="6" name="Footer Placeholder 5"/>
+          <p:cNvSpPr>
+            <a:spLocks noGrp="1"/>
+          </p:cNvSpPr>
+          <p:nvPr>
+            <p:ph type="ftr" sz="quarter" idx="4"/>
+          </p:nvPr>
+        </p:nvSpPr>
+        <p:spPr>
+          <a:xfrm>
+            <a:off x="0" y="8685213"/>
+            <a:ext cx="2971800" cy="458787"/>
+          </a:xfrm>
+          <a:prstGeom prst="rect">
+            <a:avLst/>
+          </a:prstGeom>
+        </p:spPr>
+        <p:txBody>
+          <a:bodyPr vert="horz" lIns="91440" tIns="45720" rIns="91440" bIns="45720" rtlCol="0" anchor="b"/>
+          <a:lstStyle>
+            <a:lvl1pPr algn="l">
+              <a:defRPr sz="1200"/>
+            </a:lvl1pPr>
+          </a:lstStyle>
+          <a:p>
+            <a:endParaRPr lang="en-CY"/>
+          </a:p>
+        </p:txBody>
+      </p:sp>
+      <p:sp>
+        <p:nvSpPr>
+          <p:cNvPr id="7" name="Slide Number Placeholder 6"/>
+          <p:cNvSpPr>
+            <a:spLocks noGrp="1"/>
+          </p:cNvSpPr>
+          <p:nvPr>
+            <p:ph type="sldNum" sz="quarter" idx="5"/>
+          </p:nvPr>
+        </p:nvSpPr>
+        <p:spPr>
+          <a:xfrm>
+            <a:off x="3884613" y="8685213"/>
+            <a:ext cx="2971800" cy="458787"/>
+          </a:xfrm>
+          <a:prstGeom prst="rect">
+            <a:avLst/>
+          </a:prstGeom>
+        </p:spPr>
+        <p:txBody>
+          <a:bodyPr vert="horz" lIns="91440" tIns="45720" rIns="91440" bIns="45720" rtlCol="0" anchor="b"/>
+          <a:lstStyle>
+            <a:lvl1pPr algn="r">
+              <a:defRPr sz="1200"/>
+            </a:lvl1pPr>
+          </a:lstStyle>
+          <a:p>
+            <a:fld id="{B6129C27-3634-481D-AFAC-0F02759BC1BB}" type="slidenum">
+              <a:rPr lang="en-CY" smtClean="0"/>
+              <a:t>‹#›</a:t>
+            </a:fld>
+            <a:endParaRPr lang="en-CY"/>
+          </a:p>
+        </p:txBody>
+      </p:sp>
+    </p:spTree>
+    <p:extLst>
+      <p:ext uri="{BB962C8B-B14F-4D97-AF65-F5344CB8AC3E}">
+        <p14:creationId xmlns:p14="http://schemas.microsoft.com/office/powerpoint/2010/main" val="485435814"/>
+      </p:ext>
+    </p:extLst>
+  </p:cSld>
+  <p:clrMap bg1="lt1" tx1="dk1" bg2="lt2" tx2="dk2" accent1="accent1" accent2="accent2" accent3="accent3" accent4="accent4" accent5="accent5" accent6="accent6" hlink="hlink" folHlink="folHlink"/>
+  <p:notesStyle>
+    <a:lvl1pPr marL="0" algn="l" defTabSz="914302" rtl="0" eaLnBrk="1" latinLnBrk="0" hangingPunct="1">
+      <a:defRPr sz="1200" kern="1200">
+        <a:solidFill>
+          <a:schemeClr val="tx1"/>
+        </a:solidFill>
+        <a:latin typeface="+mn-lt"/>
+        <a:ea typeface="+mn-ea"/>
+        <a:cs typeface="+mn-cs"/>
+      </a:defRPr>
+    </a:lvl1pPr>
+    <a:lvl2pPr marL="457151" algn="l" defTabSz="914302" rtl="0" eaLnBrk="1" latinLnBrk="0" hangingPunct="1">
+      <a:defRPr sz="1200" kern="1200">
+        <a:solidFill>
+          <a:schemeClr val="tx1"/>
+        </a:solidFill>
+        <a:latin typeface="+mn-lt"/>
+        <a:ea typeface="+mn-ea"/>
+        <a:cs typeface="+mn-cs"/>
+      </a:defRPr>
+    </a:lvl2pPr>
+    <a:lvl3pPr marL="914302" algn="l" defTabSz="914302" rtl="0" eaLnBrk="1" latinLnBrk="0" hangingPunct="1">
+      <a:defRPr sz="1200" kern="1200">
+        <a:solidFill>
+          <a:schemeClr val="tx1"/>
+        </a:solidFill>
+        <a:latin typeface="+mn-lt"/>
+        <a:ea typeface="+mn-ea"/>
+        <a:cs typeface="+mn-cs"/>
+      </a:defRPr>
+    </a:lvl3pPr>
+    <a:lvl4pPr marL="1371453" algn="l" defTabSz="914302" rtl="0" eaLnBrk="1" latinLnBrk="0" hangingPunct="1">
+      <a:defRPr sz="1200" kern="1200">
+        <a:solidFill>
+          <a:schemeClr val="tx1"/>
+        </a:solidFill>
+        <a:latin typeface="+mn-lt"/>
+        <a:ea typeface="+mn-ea"/>
+        <a:cs typeface="+mn-cs"/>
+      </a:defRPr>
+    </a:lvl4pPr>
+    <a:lvl5pPr marL="1828604" algn="l" defTabSz="914302" rtl="0" eaLnBrk="1" latinLnBrk="0" hangingPunct="1">
+      <a:defRPr sz="1200" kern="1200">
+        <a:solidFill>
+          <a:schemeClr val="tx1"/>
+        </a:solidFill>
+        <a:latin typeface="+mn-lt"/>
+        <a:ea typeface="+mn-ea"/>
+        <a:cs typeface="+mn-cs"/>
+      </a:defRPr>
+    </a:lvl5pPr>
+    <a:lvl6pPr marL="2285756" algn="l" defTabSz="914302" rtl="0" eaLnBrk="1" latinLnBrk="0" hangingPunct="1">
+      <a:defRPr sz="1200" kern="1200">
+        <a:solidFill>
+          <a:schemeClr val="tx1"/>
+        </a:solidFill>
+        <a:latin typeface="+mn-lt"/>
+        <a:ea typeface="+mn-ea"/>
+        <a:cs typeface="+mn-cs"/>
+      </a:defRPr>
+    </a:lvl6pPr>
+    <a:lvl7pPr marL="2742907" algn="l" defTabSz="914302" rtl="0" eaLnBrk="1" latinLnBrk="0" hangingPunct="1">
+      <a:defRPr sz="1200" kern="1200">
+        <a:solidFill>
+          <a:schemeClr val="tx1"/>
+        </a:solidFill>
+        <a:latin typeface="+mn-lt"/>
+        <a:ea typeface="+mn-ea"/>
+        <a:cs typeface="+mn-cs"/>
+      </a:defRPr>
+    </a:lvl7pPr>
+    <a:lvl8pPr marL="3200058" algn="l" defTabSz="914302" rtl="0" eaLnBrk="1" latinLnBrk="0" hangingPunct="1">
+      <a:defRPr sz="1200" kern="1200">
+        <a:solidFill>
+          <a:schemeClr val="tx1"/>
+        </a:solidFill>
+        <a:latin typeface="+mn-lt"/>
+        <a:ea typeface="+mn-ea"/>
+        <a:cs typeface="+mn-cs"/>
+      </a:defRPr>
+    </a:lvl8pPr>
+    <a:lvl9pPr marL="3657209" algn="l" defTabSz="914302" rtl="0" eaLnBrk="1" latinLnBrk="0" hangingPunct="1">
+      <a:defRPr sz="1200" kern="1200">
+        <a:solidFill>
+          <a:schemeClr val="tx1"/>
+        </a:solidFill>
+        <a:latin typeface="+mn-lt"/>
+        <a:ea typeface="+mn-ea"/>
+        <a:cs typeface="+mn-cs"/>
+      </a:defRPr>
+    </a:lvl9pPr>
+  </p:notesStyle>
+</p:notesMaster>
+</file>
+
+<file path=ppt/notesSlides/notesSlide1.xml><?xml version="1.0" encoding="utf-8"?>
+<p:notes xmlns:a="http://schemas.openxmlformats.org/drawingml/2006/main" xmlns:r="http://schemas.openxmlformats.org/officeDocument/2006/relationships" xmlns:p="http://schemas.openxmlformats.org/presentationml/2006/main">
+  <p:cSld>
+    <p:spTree>
+      <p:nvGrpSpPr>
+        <p:cNvPr id="1" name=""/>
+        <p:cNvGrpSpPr/>
+        <p:nvPr/>
+      </p:nvGrpSpPr>
+      <p:grpSpPr>
+        <a:xfrm>
+          <a:off x="0" y="0"/>
+          <a:ext cx="0" cy="0"/>
+          <a:chOff x="0" y="0"/>
+          <a:chExt cx="0" cy="0"/>
+        </a:xfrm>
+      </p:grpSpPr>
+      <p:sp>
+        <p:nvSpPr>
+          <p:cNvPr id="2" name="Slide Image Placeholder 1"/>
+          <p:cNvSpPr>
+            <a:spLocks noGrp="1" noRot="1" noChangeAspect="1"/>
+          </p:cNvSpPr>
+          <p:nvPr>
+            <p:ph type="sldImg"/>
+          </p:nvPr>
+        </p:nvSpPr>
+        <p:spPr/>
+      </p:sp>
+      <p:sp>
+        <p:nvSpPr>
+          <p:cNvPr id="3" name="Notes Placeholder 2"/>
+          <p:cNvSpPr>
+            <a:spLocks noGrp="1"/>
+          </p:cNvSpPr>
+          <p:nvPr>
+            <p:ph type="body" idx="1"/>
+          </p:nvPr>
+        </p:nvSpPr>
+        <p:spPr/>
+        <p:txBody>
+          <a:bodyPr/>
+          <a:lstStyle/>
+          <a:p>
+            <a:endParaRPr lang="en-CY" dirty="0"/>
+          </a:p>
+        </p:txBody>
+      </p:sp>
+      <p:sp>
+        <p:nvSpPr>
+          <p:cNvPr id="4" name="Slide Number Placeholder 3"/>
+          <p:cNvSpPr>
+            <a:spLocks noGrp="1"/>
+          </p:cNvSpPr>
+          <p:nvPr>
+            <p:ph type="sldNum" sz="quarter" idx="5"/>
+          </p:nvPr>
+        </p:nvSpPr>
+        <p:spPr/>
+        <p:txBody>
+          <a:bodyPr/>
+          <a:lstStyle/>
+          <a:p>
+            <a:fld id="{B6129C27-3634-481D-AFAC-0F02759BC1BB}" type="slidenum">
+              <a:rPr lang="en-CY" smtClean="0"/>
+              <a:t>1</a:t>
+            </a:fld>
+            <a:endParaRPr lang="en-CY"/>
+          </a:p>
+        </p:txBody>
+      </p:sp>
+    </p:spTree>
+    <p:extLst>
+      <p:ext uri="{BB962C8B-B14F-4D97-AF65-F5344CB8AC3E}">
+        <p14:creationId xmlns:p14="http://schemas.microsoft.com/office/powerpoint/2010/main" val="58463675"/>
+      </p:ext>
+    </p:extLst>
+  </p:cSld>
+  <p:clrMapOvr>
+    <a:masterClrMapping/>
+  </p:clrMapOvr>
+</p:notes>
 </file>
 
 <file path=ppt/slideLayouts/slideLayout1.xml><?xml version="1.0" encoding="utf-8"?>
@@ -142,7 +584,7 @@
         </p:nvSpPr>
         <p:spPr>
           <a:xfrm>
-            <a:off x="1524000" y="1122363"/>
+            <a:off x="1524001" y="1122363"/>
             <a:ext cx="9144000" cy="2387600"/>
           </a:xfrm>
         </p:spPr>
@@ -180,7 +622,7 @@
         </p:nvSpPr>
         <p:spPr>
           <a:xfrm>
-            <a:off x="1524000" y="3602038"/>
+            <a:off x="1524001" y="3602039"/>
             <a:ext cx="9144000" cy="1655762"/>
           </a:xfrm>
         </p:spPr>
@@ -191,35 +633,35 @@
               <a:buNone/>
               <a:defRPr sz="2400"/>
             </a:lvl1pPr>
-            <a:lvl2pPr marL="457200" indent="0" algn="ctr">
+            <a:lvl2pPr marL="457206" indent="0" algn="ctr">
               <a:buNone/>
               <a:defRPr sz="2000"/>
             </a:lvl2pPr>
-            <a:lvl3pPr marL="914400" indent="0" algn="ctr">
+            <a:lvl3pPr marL="914413" indent="0" algn="ctr">
               <a:buNone/>
               <a:defRPr sz="1800"/>
             </a:lvl3pPr>
-            <a:lvl4pPr marL="1371600" indent="0" algn="ctr">
+            <a:lvl4pPr marL="1371620" indent="0" algn="ctr">
               <a:buNone/>
               <a:defRPr sz="1600"/>
             </a:lvl4pPr>
-            <a:lvl5pPr marL="1828800" indent="0" algn="ctr">
+            <a:lvl5pPr marL="1828827" indent="0" algn="ctr">
               <a:buNone/>
               <a:defRPr sz="1600"/>
             </a:lvl5pPr>
-            <a:lvl6pPr marL="2286000" indent="0" algn="ctr">
+            <a:lvl6pPr marL="2286033" indent="0" algn="ctr">
               <a:buNone/>
               <a:defRPr sz="1600"/>
             </a:lvl6pPr>
-            <a:lvl7pPr marL="2743200" indent="0" algn="ctr">
+            <a:lvl7pPr marL="2743240" indent="0" algn="ctr">
               <a:buNone/>
               <a:defRPr sz="1600"/>
             </a:lvl7pPr>
-            <a:lvl8pPr marL="3200400" indent="0" algn="ctr">
+            <a:lvl8pPr marL="3200446" indent="0" algn="ctr">
               <a:buNone/>
               <a:defRPr sz="1600"/>
             </a:lvl8pPr>
-            <a:lvl9pPr marL="3657600" indent="0" algn="ctr">
+            <a:lvl9pPr marL="3657654" indent="0" algn="ctr">
               <a:buNone/>
               <a:defRPr sz="1600"/>
             </a:lvl9pPr>
@@ -256,7 +698,7 @@
           <a:p>
             <a:fld id="{CD53C273-455C-4F9A-8625-ED9FFACF621B}" type="datetimeFigureOut">
               <a:rPr lang="en-CY" smtClean="0"/>
-              <a:t>17/04/2022</a:t>
+              <a:t>18/04/2022</a:t>
             </a:fld>
             <a:endParaRPr lang="en-CY"/>
           </a:p>
@@ -456,7 +898,7 @@
           <a:p>
             <a:fld id="{CD53C273-455C-4F9A-8625-ED9FFACF621B}" type="datetimeFigureOut">
               <a:rPr lang="en-CY" smtClean="0"/>
-              <a:t>17/04/2022</a:t>
+              <a:t>18/04/2022</a:t>
             </a:fld>
             <a:endParaRPr lang="en-CY"/>
           </a:p>
@@ -564,7 +1006,7 @@
         </p:nvSpPr>
         <p:spPr>
           <a:xfrm>
-            <a:off x="8724900" y="365125"/>
+            <a:off x="8724900" y="365126"/>
             <a:ext cx="2628900" cy="5811838"/>
           </a:xfrm>
         </p:spPr>
@@ -598,7 +1040,7 @@
         </p:nvSpPr>
         <p:spPr>
           <a:xfrm>
-            <a:off x="838200" y="365125"/>
+            <a:off x="838200" y="365126"/>
             <a:ext cx="7734300" cy="5811838"/>
           </a:xfrm>
         </p:spPr>
@@ -666,7 +1108,7 @@
           <a:p>
             <a:fld id="{CD53C273-455C-4F9A-8625-ED9FFACF621B}" type="datetimeFigureOut">
               <a:rPr lang="en-CY" smtClean="0"/>
-              <a:t>17/04/2022</a:t>
+              <a:t>18/04/2022</a:t>
             </a:fld>
             <a:endParaRPr lang="en-CY"/>
           </a:p>
@@ -866,7 +1308,7 @@
           <a:p>
             <a:fld id="{CD53C273-455C-4F9A-8625-ED9FFACF621B}" type="datetimeFigureOut">
               <a:rPr lang="en-CY" smtClean="0"/>
-              <a:t>17/04/2022</a:t>
+              <a:t>18/04/2022</a:t>
             </a:fld>
             <a:endParaRPr lang="en-CY"/>
           </a:p>
@@ -1012,7 +1454,7 @@
         </p:nvSpPr>
         <p:spPr>
           <a:xfrm>
-            <a:off x="831850" y="4589463"/>
+            <a:off x="831850" y="4589464"/>
             <a:ext cx="10515600" cy="1500187"/>
           </a:xfrm>
         </p:spPr>
@@ -1029,7 +1471,7 @@
                 </a:solidFill>
               </a:defRPr>
             </a:lvl1pPr>
-            <a:lvl2pPr marL="457200" indent="0">
+            <a:lvl2pPr marL="457206" indent="0">
               <a:buNone/>
               <a:defRPr sz="2000">
                 <a:solidFill>
@@ -1039,7 +1481,7 @@
                 </a:solidFill>
               </a:defRPr>
             </a:lvl2pPr>
-            <a:lvl3pPr marL="914400" indent="0">
+            <a:lvl3pPr marL="914413" indent="0">
               <a:buNone/>
               <a:defRPr sz="1800">
                 <a:solidFill>
@@ -1049,7 +1491,7 @@
                 </a:solidFill>
               </a:defRPr>
             </a:lvl3pPr>
-            <a:lvl4pPr marL="1371600" indent="0">
+            <a:lvl4pPr marL="1371620" indent="0">
               <a:buNone/>
               <a:defRPr sz="1600">
                 <a:solidFill>
@@ -1059,7 +1501,7 @@
                 </a:solidFill>
               </a:defRPr>
             </a:lvl4pPr>
-            <a:lvl5pPr marL="1828800" indent="0">
+            <a:lvl5pPr marL="1828827" indent="0">
               <a:buNone/>
               <a:defRPr sz="1600">
                 <a:solidFill>
@@ -1069,7 +1511,7 @@
                 </a:solidFill>
               </a:defRPr>
             </a:lvl5pPr>
-            <a:lvl6pPr marL="2286000" indent="0">
+            <a:lvl6pPr marL="2286033" indent="0">
               <a:buNone/>
               <a:defRPr sz="1600">
                 <a:solidFill>
@@ -1079,7 +1521,7 @@
                 </a:solidFill>
               </a:defRPr>
             </a:lvl6pPr>
-            <a:lvl7pPr marL="2743200" indent="0">
+            <a:lvl7pPr marL="2743240" indent="0">
               <a:buNone/>
               <a:defRPr sz="1600">
                 <a:solidFill>
@@ -1089,7 +1531,7 @@
                 </a:solidFill>
               </a:defRPr>
             </a:lvl7pPr>
-            <a:lvl8pPr marL="3200400" indent="0">
+            <a:lvl8pPr marL="3200446" indent="0">
               <a:buNone/>
               <a:defRPr sz="1600">
                 <a:solidFill>
@@ -1099,7 +1541,7 @@
                 </a:solidFill>
               </a:defRPr>
             </a:lvl8pPr>
-            <a:lvl9pPr marL="3657600" indent="0">
+            <a:lvl9pPr marL="3657654" indent="0">
               <a:buNone/>
               <a:defRPr sz="1600">
                 <a:solidFill>
@@ -1142,7 +1584,7 @@
           <a:p>
             <a:fld id="{CD53C273-455C-4F9A-8625-ED9FFACF621B}" type="datetimeFigureOut">
               <a:rPr lang="en-CY" smtClean="0"/>
-              <a:t>17/04/2022</a:t>
+              <a:t>18/04/2022</a:t>
             </a:fld>
             <a:endParaRPr lang="en-CY"/>
           </a:p>
@@ -1342,7 +1784,7 @@
         </p:nvSpPr>
         <p:spPr>
           <a:xfrm>
-            <a:off x="6172200" y="1825625"/>
+            <a:off x="6172201" y="1825625"/>
             <a:ext cx="5181600" cy="4351338"/>
           </a:xfrm>
         </p:spPr>
@@ -1410,7 +1852,7 @@
           <a:p>
             <a:fld id="{CD53C273-455C-4F9A-8625-ED9FFACF621B}" type="datetimeFigureOut">
               <a:rPr lang="en-CY" smtClean="0"/>
-              <a:t>17/04/2022</a:t>
+              <a:t>18/04/2022</a:t>
             </a:fld>
             <a:endParaRPr lang="en-CY"/>
           </a:p>
@@ -1552,7 +1994,7 @@
         </p:nvSpPr>
         <p:spPr>
           <a:xfrm>
-            <a:off x="839788" y="1681163"/>
+            <a:off x="839789" y="1681163"/>
             <a:ext cx="5157787" cy="823912"/>
           </a:xfrm>
         </p:spPr>
@@ -1563,35 +2005,35 @@
               <a:buNone/>
               <a:defRPr sz="2400" b="1"/>
             </a:lvl1pPr>
-            <a:lvl2pPr marL="457200" indent="0">
+            <a:lvl2pPr marL="457206" indent="0">
               <a:buNone/>
               <a:defRPr sz="2000" b="1"/>
             </a:lvl2pPr>
-            <a:lvl3pPr marL="914400" indent="0">
+            <a:lvl3pPr marL="914413" indent="0">
               <a:buNone/>
               <a:defRPr sz="1800" b="1"/>
             </a:lvl3pPr>
-            <a:lvl4pPr marL="1371600" indent="0">
+            <a:lvl4pPr marL="1371620" indent="0">
               <a:buNone/>
               <a:defRPr sz="1600" b="1"/>
             </a:lvl4pPr>
-            <a:lvl5pPr marL="1828800" indent="0">
+            <a:lvl5pPr marL="1828827" indent="0">
               <a:buNone/>
               <a:defRPr sz="1600" b="1"/>
             </a:lvl5pPr>
-            <a:lvl6pPr marL="2286000" indent="0">
+            <a:lvl6pPr marL="2286033" indent="0">
               <a:buNone/>
               <a:defRPr sz="1600" b="1"/>
             </a:lvl6pPr>
-            <a:lvl7pPr marL="2743200" indent="0">
+            <a:lvl7pPr marL="2743240" indent="0">
               <a:buNone/>
               <a:defRPr sz="1600" b="1"/>
             </a:lvl7pPr>
-            <a:lvl8pPr marL="3200400" indent="0">
+            <a:lvl8pPr marL="3200446" indent="0">
               <a:buNone/>
               <a:defRPr sz="1600" b="1"/>
             </a:lvl8pPr>
-            <a:lvl9pPr marL="3657600" indent="0">
+            <a:lvl9pPr marL="3657654" indent="0">
               <a:buNone/>
               <a:defRPr sz="1600" b="1"/>
             </a:lvl9pPr>
@@ -1623,7 +2065,7 @@
         </p:nvSpPr>
         <p:spPr>
           <a:xfrm>
-            <a:off x="839788" y="2505075"/>
+            <a:off x="839789" y="2505075"/>
             <a:ext cx="5157787" cy="3684588"/>
           </a:xfrm>
         </p:spPr>
@@ -1697,35 +2139,35 @@
               <a:buNone/>
               <a:defRPr sz="2400" b="1"/>
             </a:lvl1pPr>
-            <a:lvl2pPr marL="457200" indent="0">
+            <a:lvl2pPr marL="457206" indent="0">
               <a:buNone/>
               <a:defRPr sz="2000" b="1"/>
             </a:lvl2pPr>
-            <a:lvl3pPr marL="914400" indent="0">
+            <a:lvl3pPr marL="914413" indent="0">
               <a:buNone/>
               <a:defRPr sz="1800" b="1"/>
             </a:lvl3pPr>
-            <a:lvl4pPr marL="1371600" indent="0">
+            <a:lvl4pPr marL="1371620" indent="0">
               <a:buNone/>
               <a:defRPr sz="1600" b="1"/>
             </a:lvl4pPr>
-            <a:lvl5pPr marL="1828800" indent="0">
+            <a:lvl5pPr marL="1828827" indent="0">
               <a:buNone/>
               <a:defRPr sz="1600" b="1"/>
             </a:lvl5pPr>
-            <a:lvl6pPr marL="2286000" indent="0">
+            <a:lvl6pPr marL="2286033" indent="0">
               <a:buNone/>
               <a:defRPr sz="1600" b="1"/>
             </a:lvl6pPr>
-            <a:lvl7pPr marL="2743200" indent="0">
+            <a:lvl7pPr marL="2743240" indent="0">
               <a:buNone/>
               <a:defRPr sz="1600" b="1"/>
             </a:lvl7pPr>
-            <a:lvl8pPr marL="3200400" indent="0">
+            <a:lvl8pPr marL="3200446" indent="0">
               <a:buNone/>
               <a:defRPr sz="1600" b="1"/>
             </a:lvl8pPr>
-            <a:lvl9pPr marL="3657600" indent="0">
+            <a:lvl9pPr marL="3657654" indent="0">
               <a:buNone/>
               <a:defRPr sz="1600" b="1"/>
             </a:lvl9pPr>
@@ -1825,7 +2267,7 @@
           <a:p>
             <a:fld id="{CD53C273-455C-4F9A-8625-ED9FFACF621B}" type="datetimeFigureOut">
               <a:rPr lang="en-CY" smtClean="0"/>
-              <a:t>17/04/2022</a:t>
+              <a:t>18/04/2022</a:t>
             </a:fld>
             <a:endParaRPr lang="en-CY"/>
           </a:p>
@@ -1967,7 +2409,7 @@
           <a:p>
             <a:fld id="{CD53C273-455C-4F9A-8625-ED9FFACF621B}" type="datetimeFigureOut">
               <a:rPr lang="en-CY" smtClean="0"/>
-              <a:t>17/04/2022</a:t>
+              <a:t>18/04/2022</a:t>
             </a:fld>
             <a:endParaRPr lang="en-CY"/>
           </a:p>
@@ -2080,7 +2522,7 @@
           <a:p>
             <a:fld id="{CD53C273-455C-4F9A-8625-ED9FFACF621B}" type="datetimeFigureOut">
               <a:rPr lang="en-CY" smtClean="0"/>
-              <a:t>17/04/2022</a:t>
+              <a:t>18/04/2022</a:t>
             </a:fld>
             <a:endParaRPr lang="en-CY"/>
           </a:p>
@@ -2188,7 +2630,7 @@
         </p:nvSpPr>
         <p:spPr>
           <a:xfrm>
-            <a:off x="839788" y="457200"/>
+            <a:off x="839789" y="457200"/>
             <a:ext cx="3932237" cy="1600200"/>
           </a:xfrm>
         </p:spPr>
@@ -2226,7 +2668,7 @@
         </p:nvSpPr>
         <p:spPr>
           <a:xfrm>
-            <a:off x="5183188" y="987425"/>
+            <a:off x="5183188" y="987426"/>
             <a:ext cx="6172200" cy="4873625"/>
           </a:xfrm>
         </p:spPr>
@@ -2317,7 +2759,7 @@
         </p:nvSpPr>
         <p:spPr>
           <a:xfrm>
-            <a:off x="839788" y="2057400"/>
+            <a:off x="839789" y="2057400"/>
             <a:ext cx="3932237" cy="3811588"/>
           </a:xfrm>
         </p:spPr>
@@ -2328,35 +2770,35 @@
               <a:buNone/>
               <a:defRPr sz="1600"/>
             </a:lvl1pPr>
-            <a:lvl2pPr marL="457200" indent="0">
+            <a:lvl2pPr marL="457206" indent="0">
               <a:buNone/>
               <a:defRPr sz="1400"/>
             </a:lvl2pPr>
-            <a:lvl3pPr marL="914400" indent="0">
+            <a:lvl3pPr marL="914413" indent="0">
               <a:buNone/>
               <a:defRPr sz="1200"/>
             </a:lvl3pPr>
-            <a:lvl4pPr marL="1371600" indent="0">
+            <a:lvl4pPr marL="1371620" indent="0">
               <a:buNone/>
               <a:defRPr sz="1000"/>
             </a:lvl4pPr>
-            <a:lvl5pPr marL="1828800" indent="0">
+            <a:lvl5pPr marL="1828827" indent="0">
               <a:buNone/>
               <a:defRPr sz="1000"/>
             </a:lvl5pPr>
-            <a:lvl6pPr marL="2286000" indent="0">
+            <a:lvl6pPr marL="2286033" indent="0">
               <a:buNone/>
               <a:defRPr sz="1000"/>
             </a:lvl6pPr>
-            <a:lvl7pPr marL="2743200" indent="0">
+            <a:lvl7pPr marL="2743240" indent="0">
               <a:buNone/>
               <a:defRPr sz="1000"/>
             </a:lvl7pPr>
-            <a:lvl8pPr marL="3200400" indent="0">
+            <a:lvl8pPr marL="3200446" indent="0">
               <a:buNone/>
               <a:defRPr sz="1000"/>
             </a:lvl8pPr>
-            <a:lvl9pPr marL="3657600" indent="0">
+            <a:lvl9pPr marL="3657654" indent="0">
               <a:buNone/>
               <a:defRPr sz="1000"/>
             </a:lvl9pPr>
@@ -2393,7 +2835,7 @@
           <a:p>
             <a:fld id="{CD53C273-455C-4F9A-8625-ED9FFACF621B}" type="datetimeFigureOut">
               <a:rPr lang="en-CY" smtClean="0"/>
-              <a:t>17/04/2022</a:t>
+              <a:t>18/04/2022</a:t>
             </a:fld>
             <a:endParaRPr lang="en-CY"/>
           </a:p>
@@ -2501,7 +2943,7 @@
         </p:nvSpPr>
         <p:spPr>
           <a:xfrm>
-            <a:off x="839788" y="457200"/>
+            <a:off x="839789" y="457200"/>
             <a:ext cx="3932237" cy="1600200"/>
           </a:xfrm>
         </p:spPr>
@@ -2539,7 +2981,7 @@
         </p:nvSpPr>
         <p:spPr>
           <a:xfrm>
-            <a:off x="5183188" y="987425"/>
+            <a:off x="5183188" y="987426"/>
             <a:ext cx="6172200" cy="4873625"/>
           </a:xfrm>
         </p:spPr>
@@ -2550,35 +2992,35 @@
               <a:buNone/>
               <a:defRPr sz="3200"/>
             </a:lvl1pPr>
-            <a:lvl2pPr marL="457200" indent="0">
+            <a:lvl2pPr marL="457206" indent="0">
               <a:buNone/>
               <a:defRPr sz="2800"/>
             </a:lvl2pPr>
-            <a:lvl3pPr marL="914400" indent="0">
+            <a:lvl3pPr marL="914413" indent="0">
               <a:buNone/>
               <a:defRPr sz="2400"/>
             </a:lvl3pPr>
-            <a:lvl4pPr marL="1371600" indent="0">
+            <a:lvl4pPr marL="1371620" indent="0">
               <a:buNone/>
               <a:defRPr sz="2000"/>
             </a:lvl4pPr>
-            <a:lvl5pPr marL="1828800" indent="0">
+            <a:lvl5pPr marL="1828827" indent="0">
               <a:buNone/>
               <a:defRPr sz="2000"/>
             </a:lvl5pPr>
-            <a:lvl6pPr marL="2286000" indent="0">
+            <a:lvl6pPr marL="2286033" indent="0">
               <a:buNone/>
               <a:defRPr sz="2000"/>
             </a:lvl6pPr>
-            <a:lvl7pPr marL="2743200" indent="0">
+            <a:lvl7pPr marL="2743240" indent="0">
               <a:buNone/>
               <a:defRPr sz="2000"/>
             </a:lvl7pPr>
-            <a:lvl8pPr marL="3200400" indent="0">
+            <a:lvl8pPr marL="3200446" indent="0">
               <a:buNone/>
               <a:defRPr sz="2000"/>
             </a:lvl8pPr>
-            <a:lvl9pPr marL="3657600" indent="0">
+            <a:lvl9pPr marL="3657654" indent="0">
               <a:buNone/>
               <a:defRPr sz="2000"/>
             </a:lvl9pPr>
@@ -2606,7 +3048,7 @@
         </p:nvSpPr>
         <p:spPr>
           <a:xfrm>
-            <a:off x="839788" y="2057400"/>
+            <a:off x="839789" y="2057400"/>
             <a:ext cx="3932237" cy="3811588"/>
           </a:xfrm>
         </p:spPr>
@@ -2617,35 +3059,35 @@
               <a:buNone/>
               <a:defRPr sz="1600"/>
             </a:lvl1pPr>
-            <a:lvl2pPr marL="457200" indent="0">
+            <a:lvl2pPr marL="457206" indent="0">
               <a:buNone/>
               <a:defRPr sz="1400"/>
             </a:lvl2pPr>
-            <a:lvl3pPr marL="914400" indent="0">
+            <a:lvl3pPr marL="914413" indent="0">
               <a:buNone/>
               <a:defRPr sz="1200"/>
             </a:lvl3pPr>
-            <a:lvl4pPr marL="1371600" indent="0">
+            <a:lvl4pPr marL="1371620" indent="0">
               <a:buNone/>
               <a:defRPr sz="1000"/>
             </a:lvl4pPr>
-            <a:lvl5pPr marL="1828800" indent="0">
+            <a:lvl5pPr marL="1828827" indent="0">
               <a:buNone/>
               <a:defRPr sz="1000"/>
             </a:lvl5pPr>
-            <a:lvl6pPr marL="2286000" indent="0">
+            <a:lvl6pPr marL="2286033" indent="0">
               <a:buNone/>
               <a:defRPr sz="1000"/>
             </a:lvl6pPr>
-            <a:lvl7pPr marL="2743200" indent="0">
+            <a:lvl7pPr marL="2743240" indent="0">
               <a:buNone/>
               <a:defRPr sz="1000"/>
             </a:lvl7pPr>
-            <a:lvl8pPr marL="3200400" indent="0">
+            <a:lvl8pPr marL="3200446" indent="0">
               <a:buNone/>
               <a:defRPr sz="1000"/>
             </a:lvl8pPr>
-            <a:lvl9pPr marL="3657600" indent="0">
+            <a:lvl9pPr marL="3657654" indent="0">
               <a:buNone/>
               <a:defRPr sz="1000"/>
             </a:lvl9pPr>
@@ -2682,7 +3124,7 @@
           <a:p>
             <a:fld id="{CD53C273-455C-4F9A-8625-ED9FFACF621B}" type="datetimeFigureOut">
               <a:rPr lang="en-CY" smtClean="0"/>
-              <a:t>17/04/2022</a:t>
+              <a:t>18/04/2022</a:t>
             </a:fld>
             <a:endParaRPr lang="en-CY"/>
           </a:p>
@@ -2902,7 +3344,7 @@
         </p:nvSpPr>
         <p:spPr>
           <a:xfrm>
-            <a:off x="838200" y="6356350"/>
+            <a:off x="838200" y="6356351"/>
             <a:ext cx="2743200" cy="365125"/>
           </a:xfrm>
           <a:prstGeom prst="rect">
@@ -2925,7 +3367,7 @@
           <a:p>
             <a:fld id="{CD53C273-455C-4F9A-8625-ED9FFACF621B}" type="datetimeFigureOut">
               <a:rPr lang="en-CY" smtClean="0"/>
-              <a:t>17/04/2022</a:t>
+              <a:t>18/04/2022</a:t>
             </a:fld>
             <a:endParaRPr lang="en-CY"/>
           </a:p>
@@ -2949,7 +3391,7 @@
         </p:nvSpPr>
         <p:spPr>
           <a:xfrm>
-            <a:off x="4038600" y="6356350"/>
+            <a:off x="4038600" y="6356351"/>
             <a:ext cx="4114800" cy="365125"/>
           </a:xfrm>
           <a:prstGeom prst="rect">
@@ -2992,7 +3434,7 @@
         </p:nvSpPr>
         <p:spPr>
           <a:xfrm>
-            <a:off x="8610600" y="6356350"/>
+            <a:off x="8610601" y="6356351"/>
             <a:ext cx="2743200" cy="365125"/>
           </a:xfrm>
           <a:prstGeom prst="rect">
@@ -3044,7 +3486,7 @@
   </p:sldLayoutIdLst>
   <p:txStyles>
     <p:titleStyle>
-      <a:lvl1pPr algn="l" defTabSz="914400" rtl="0" eaLnBrk="1" latinLnBrk="0" hangingPunct="1">
+      <a:lvl1pPr algn="l" defTabSz="914413" rtl="0" eaLnBrk="1" latinLnBrk="0" hangingPunct="1">
         <a:lnSpc>
           <a:spcPct val="90000"/>
         </a:lnSpc>
@@ -3063,7 +3505,7 @@
       </a:lvl1pPr>
     </p:titleStyle>
     <p:bodyStyle>
-      <a:lvl1pPr marL="228600" indent="-228600" algn="l" defTabSz="914400" rtl="0" eaLnBrk="1" latinLnBrk="0" hangingPunct="1">
+      <a:lvl1pPr marL="228603" indent="-228603" algn="l" defTabSz="914413" rtl="0" eaLnBrk="1" latinLnBrk="0" hangingPunct="1">
         <a:lnSpc>
           <a:spcPct val="90000"/>
         </a:lnSpc>
@@ -3081,7 +3523,7 @@
           <a:cs typeface="+mn-cs"/>
         </a:defRPr>
       </a:lvl1pPr>
-      <a:lvl2pPr marL="685800" indent="-228600" algn="l" defTabSz="914400" rtl="0" eaLnBrk="1" latinLnBrk="0" hangingPunct="1">
+      <a:lvl2pPr marL="685810" indent="-228603" algn="l" defTabSz="914413" rtl="0" eaLnBrk="1" latinLnBrk="0" hangingPunct="1">
         <a:lnSpc>
           <a:spcPct val="90000"/>
         </a:lnSpc>
@@ -3099,7 +3541,7 @@
           <a:cs typeface="+mn-cs"/>
         </a:defRPr>
       </a:lvl2pPr>
-      <a:lvl3pPr marL="1143000" indent="-228600" algn="l" defTabSz="914400" rtl="0" eaLnBrk="1" latinLnBrk="0" hangingPunct="1">
+      <a:lvl3pPr marL="1143017" indent="-228603" algn="l" defTabSz="914413" rtl="0" eaLnBrk="1" latinLnBrk="0" hangingPunct="1">
         <a:lnSpc>
           <a:spcPct val="90000"/>
         </a:lnSpc>
@@ -3117,7 +3559,7 @@
           <a:cs typeface="+mn-cs"/>
         </a:defRPr>
       </a:lvl3pPr>
-      <a:lvl4pPr marL="1600200" indent="-228600" algn="l" defTabSz="914400" rtl="0" eaLnBrk="1" latinLnBrk="0" hangingPunct="1">
+      <a:lvl4pPr marL="1600224" indent="-228603" algn="l" defTabSz="914413" rtl="0" eaLnBrk="1" latinLnBrk="0" hangingPunct="1">
         <a:lnSpc>
           <a:spcPct val="90000"/>
         </a:lnSpc>
@@ -3135,7 +3577,7 @@
           <a:cs typeface="+mn-cs"/>
         </a:defRPr>
       </a:lvl4pPr>
-      <a:lvl5pPr marL="2057400" indent="-228600" algn="l" defTabSz="914400" rtl="0" eaLnBrk="1" latinLnBrk="0" hangingPunct="1">
+      <a:lvl5pPr marL="2057430" indent="-228603" algn="l" defTabSz="914413" rtl="0" eaLnBrk="1" latinLnBrk="0" hangingPunct="1">
         <a:lnSpc>
           <a:spcPct val="90000"/>
         </a:lnSpc>
@@ -3153,7 +3595,7 @@
           <a:cs typeface="+mn-cs"/>
         </a:defRPr>
       </a:lvl5pPr>
-      <a:lvl6pPr marL="2514600" indent="-228600" algn="l" defTabSz="914400" rtl="0" eaLnBrk="1" latinLnBrk="0" hangingPunct="1">
+      <a:lvl6pPr marL="2514637" indent="-228603" algn="l" defTabSz="914413" rtl="0" eaLnBrk="1" latinLnBrk="0" hangingPunct="1">
         <a:lnSpc>
           <a:spcPct val="90000"/>
         </a:lnSpc>
@@ -3171,7 +3613,7 @@
           <a:cs typeface="+mn-cs"/>
         </a:defRPr>
       </a:lvl6pPr>
-      <a:lvl7pPr marL="2971800" indent="-228600" algn="l" defTabSz="914400" rtl="0" eaLnBrk="1" latinLnBrk="0" hangingPunct="1">
+      <a:lvl7pPr marL="2971843" indent="-228603" algn="l" defTabSz="914413" rtl="0" eaLnBrk="1" latinLnBrk="0" hangingPunct="1">
         <a:lnSpc>
           <a:spcPct val="90000"/>
         </a:lnSpc>
@@ -3189,7 +3631,7 @@
           <a:cs typeface="+mn-cs"/>
         </a:defRPr>
       </a:lvl7pPr>
-      <a:lvl8pPr marL="3429000" indent="-228600" algn="l" defTabSz="914400" rtl="0" eaLnBrk="1" latinLnBrk="0" hangingPunct="1">
+      <a:lvl8pPr marL="3429051" indent="-228603" algn="l" defTabSz="914413" rtl="0" eaLnBrk="1" latinLnBrk="0" hangingPunct="1">
         <a:lnSpc>
           <a:spcPct val="90000"/>
         </a:lnSpc>
@@ -3207,7 +3649,7 @@
           <a:cs typeface="+mn-cs"/>
         </a:defRPr>
       </a:lvl8pPr>
-      <a:lvl9pPr marL="3886200" indent="-228600" algn="l" defTabSz="914400" rtl="0" eaLnBrk="1" latinLnBrk="0" hangingPunct="1">
+      <a:lvl9pPr marL="3886257" indent="-228603" algn="l" defTabSz="914413" rtl="0" eaLnBrk="1" latinLnBrk="0" hangingPunct="1">
         <a:lnSpc>
           <a:spcPct val="90000"/>
         </a:lnSpc>
@@ -3230,7 +3672,7 @@
       <a:defPPr>
         <a:defRPr lang="en-CY"/>
       </a:defPPr>
-      <a:lvl1pPr marL="0" algn="l" defTabSz="914400" rtl="0" eaLnBrk="1" latinLnBrk="0" hangingPunct="1">
+      <a:lvl1pPr marL="0" algn="l" defTabSz="914413" rtl="0" eaLnBrk="1" latinLnBrk="0" hangingPunct="1">
         <a:defRPr sz="1800" kern="1200">
           <a:solidFill>
             <a:schemeClr val="tx1"/>
@@ -3240,7 +3682,7 @@
           <a:cs typeface="+mn-cs"/>
         </a:defRPr>
       </a:lvl1pPr>
-      <a:lvl2pPr marL="457200" algn="l" defTabSz="914400" rtl="0" eaLnBrk="1" latinLnBrk="0" hangingPunct="1">
+      <a:lvl2pPr marL="457206" algn="l" defTabSz="914413" rtl="0" eaLnBrk="1" latinLnBrk="0" hangingPunct="1">
         <a:defRPr sz="1800" kern="1200">
           <a:solidFill>
             <a:schemeClr val="tx1"/>
@@ -3250,7 +3692,7 @@
           <a:cs typeface="+mn-cs"/>
         </a:defRPr>
       </a:lvl2pPr>
-      <a:lvl3pPr marL="914400" algn="l" defTabSz="914400" rtl="0" eaLnBrk="1" latinLnBrk="0" hangingPunct="1">
+      <a:lvl3pPr marL="914413" algn="l" defTabSz="914413" rtl="0" eaLnBrk="1" latinLnBrk="0" hangingPunct="1">
         <a:defRPr sz="1800" kern="1200">
           <a:solidFill>
             <a:schemeClr val="tx1"/>
@@ -3260,7 +3702,7 @@
           <a:cs typeface="+mn-cs"/>
         </a:defRPr>
       </a:lvl3pPr>
-      <a:lvl4pPr marL="1371600" algn="l" defTabSz="914400" rtl="0" eaLnBrk="1" latinLnBrk="0" hangingPunct="1">
+      <a:lvl4pPr marL="1371620" algn="l" defTabSz="914413" rtl="0" eaLnBrk="1" latinLnBrk="0" hangingPunct="1">
         <a:defRPr sz="1800" kern="1200">
           <a:solidFill>
             <a:schemeClr val="tx1"/>
@@ -3270,7 +3712,7 @@
           <a:cs typeface="+mn-cs"/>
         </a:defRPr>
       </a:lvl4pPr>
-      <a:lvl5pPr marL="1828800" algn="l" defTabSz="914400" rtl="0" eaLnBrk="1" latinLnBrk="0" hangingPunct="1">
+      <a:lvl5pPr marL="1828827" algn="l" defTabSz="914413" rtl="0" eaLnBrk="1" latinLnBrk="0" hangingPunct="1">
         <a:defRPr sz="1800" kern="1200">
           <a:solidFill>
             <a:schemeClr val="tx1"/>
@@ -3280,7 +3722,7 @@
           <a:cs typeface="+mn-cs"/>
         </a:defRPr>
       </a:lvl5pPr>
-      <a:lvl6pPr marL="2286000" algn="l" defTabSz="914400" rtl="0" eaLnBrk="1" latinLnBrk="0" hangingPunct="1">
+      <a:lvl6pPr marL="2286033" algn="l" defTabSz="914413" rtl="0" eaLnBrk="1" latinLnBrk="0" hangingPunct="1">
         <a:defRPr sz="1800" kern="1200">
           <a:solidFill>
             <a:schemeClr val="tx1"/>
@@ -3290,7 +3732,7 @@
           <a:cs typeface="+mn-cs"/>
         </a:defRPr>
       </a:lvl6pPr>
-      <a:lvl7pPr marL="2743200" algn="l" defTabSz="914400" rtl="0" eaLnBrk="1" latinLnBrk="0" hangingPunct="1">
+      <a:lvl7pPr marL="2743240" algn="l" defTabSz="914413" rtl="0" eaLnBrk="1" latinLnBrk="0" hangingPunct="1">
         <a:defRPr sz="1800" kern="1200">
           <a:solidFill>
             <a:schemeClr val="tx1"/>
@@ -3300,7 +3742,7 @@
           <a:cs typeface="+mn-cs"/>
         </a:defRPr>
       </a:lvl7pPr>
-      <a:lvl8pPr marL="3200400" algn="l" defTabSz="914400" rtl="0" eaLnBrk="1" latinLnBrk="0" hangingPunct="1">
+      <a:lvl8pPr marL="3200446" algn="l" defTabSz="914413" rtl="0" eaLnBrk="1" latinLnBrk="0" hangingPunct="1">
         <a:defRPr sz="1800" kern="1200">
           <a:solidFill>
             <a:schemeClr val="tx1"/>
@@ -3310,7 +3752,7 @@
           <a:cs typeface="+mn-cs"/>
         </a:defRPr>
       </a:lvl8pPr>
-      <a:lvl9pPr marL="3657600" algn="l" defTabSz="914400" rtl="0" eaLnBrk="1" latinLnBrk="0" hangingPunct="1">
+      <a:lvl9pPr marL="3657654" algn="l" defTabSz="914413" rtl="0" eaLnBrk="1" latinLnBrk="0" hangingPunct="1">
         <a:defRPr sz="1800" kern="1200">
           <a:solidFill>
             <a:schemeClr val="tx1"/>
@@ -3333,13 +3775,13 @@
         <a:gradFill rotWithShape="1">
           <a:gsLst>
             <a:gs pos="8000">
-              <a:schemeClr val="tx2"/>
+              <a:schemeClr val="tx1"/>
             </a:gs>
-            <a:gs pos="49000">
-              <a:schemeClr val="tx2"/>
+            <a:gs pos="76000">
+              <a:schemeClr val="tx1"/>
             </a:gs>
             <a:gs pos="94000">
-              <a:schemeClr val="tx2"/>
+              <a:schemeClr val="tx1"/>
             </a:gs>
           </a:gsLst>
           <a:lin ang="5400000" scaled="0"/>
@@ -3375,8 +3817,8 @@
         </p:nvSpPr>
         <p:spPr>
           <a:xfrm>
-            <a:off x="0" y="0"/>
-            <a:ext cx="12192000" cy="1015663"/>
+            <a:off x="0" y="-58"/>
+            <a:ext cx="12192000" cy="811411"/>
           </a:xfrm>
           <a:prstGeom prst="rect">
             <a:avLst/>
@@ -3396,7 +3838,7 @@
           <a:p>
             <a:pPr algn="ctr"/>
             <a:r>
-              <a:rPr lang="en-US" sz="2400" dirty="0">
+              <a:rPr lang="en-US" sz="2000" dirty="0">
                 <a:solidFill>
                   <a:schemeClr val="bg1"/>
                 </a:solidFill>
@@ -3411,7 +3853,7 @@
               </a:rPr>
             </a:br>
             <a:r>
-              <a:rPr lang="en-US" dirty="0">
+              <a:rPr lang="en-US" sz="1600" dirty="0">
                 <a:solidFill>
                   <a:schemeClr val="bg1"/>
                 </a:solidFill>
@@ -3419,7 +3861,7 @@
               <a:t>Pedro Caetano, Matthew Culley, Sean </a:t>
             </a:r>
             <a:r>
-              <a:rPr lang="en-US" dirty="0" err="1">
+              <a:rPr lang="en-US" sz="1600" dirty="0" err="1">
                 <a:solidFill>
                   <a:schemeClr val="bg1"/>
                 </a:solidFill>
@@ -3427,7 +3869,7 @@
               <a:t>Coaker</a:t>
             </a:r>
             <a:r>
-              <a:rPr lang="en-US" dirty="0">
+              <a:rPr lang="en-US" sz="1600" dirty="0">
                 <a:solidFill>
                   <a:schemeClr val="bg1"/>
                 </a:solidFill>
@@ -3435,21 +3877,21 @@
               <a:t>, Panayiotis Melios</a:t>
             </a:r>
             <a:br>
-              <a:rPr lang="en-US" dirty="0">
+              <a:rPr lang="en-US" sz="1600" dirty="0">
                 <a:solidFill>
                   <a:schemeClr val="bg1"/>
                 </a:solidFill>
               </a:rPr>
             </a:br>
             <a:r>
-              <a:rPr lang="en-US" dirty="0">
+              <a:rPr lang="en-US" sz="1600" dirty="0">
                 <a:solidFill>
                   <a:schemeClr val="bg1"/>
                 </a:solidFill>
               </a:rPr>
               <a:t>Swansea University</a:t>
             </a:r>
-            <a:endParaRPr lang="en-CY" dirty="0">
+            <a:endParaRPr lang="en-CY" sz="1905" dirty="0">
               <a:solidFill>
                 <a:schemeClr val="bg1"/>
               </a:solidFill>
@@ -3471,8 +3913,8 @@
         </p:nvSpPr>
         <p:spPr>
           <a:xfrm>
-            <a:off x="62160" y="1382494"/>
-            <a:ext cx="3799610" cy="830997"/>
+            <a:off x="62160" y="1192324"/>
+            <a:ext cx="3799610" cy="1200329"/>
           </a:xfrm>
           <a:prstGeom prst="rect">
             <a:avLst/>
@@ -3502,9 +3944,9 @@
                   <a:schemeClr val="bg1"/>
                 </a:solidFill>
               </a:rPr>
-              <a:t>Through the module Software Testing, we were given the chance to implement a system for Bangor Health Clinic. The system will be used for dementia patients, reminding them to take their walking aids.</a:t>
-            </a:r>
-            <a:endParaRPr lang="en-CY" dirty="0">
+              <a:t>Through the module Software Testing, we were given the chance to implement a system for Bangor Health Clinic. The system will be used for dementia patients, reminding them to take their walking aids. The system requires two devices that will communicate and an SD card where a familiar voice of the patient will be stored. </a:t>
+            </a:r>
+            <a:endParaRPr lang="en-CY" sz="1905" dirty="0">
               <a:solidFill>
                 <a:schemeClr val="bg1"/>
               </a:solidFill>
@@ -3526,8 +3968,8 @@
         </p:nvSpPr>
         <p:spPr>
           <a:xfrm>
-            <a:off x="62160" y="3429000"/>
-            <a:ext cx="3817347" cy="1569660"/>
+            <a:off x="62161" y="2795492"/>
+            <a:ext cx="3817347" cy="1754326"/>
           </a:xfrm>
           <a:prstGeom prst="rect">
             <a:avLst/>
@@ -3574,9 +4016,9 @@
                   <a:schemeClr val="bg1"/>
                 </a:solidFill>
               </a:rPr>
-              <a:t>Our solution is built as one device on the walking aid and another wearable device for the user that indicates whether the user is walking.</a:t>
-            </a:r>
-            <a:endParaRPr lang="en-CY" dirty="0">
+              <a:t>Our solution is built as one device on the walking aid which includes a speaker, that will inform the user to take the walking aid, and another wearable device for the user that indicates whether the user is walking.</a:t>
+            </a:r>
+            <a:endParaRPr lang="en-CY" sz="1905" dirty="0">
               <a:solidFill>
                 <a:schemeClr val="bg1"/>
               </a:solidFill>
@@ -3598,8 +4040,8 @@
         </p:nvSpPr>
         <p:spPr>
           <a:xfrm>
-            <a:off x="4197936" y="1384993"/>
-            <a:ext cx="3813866" cy="461665"/>
+            <a:off x="4197936" y="1194823"/>
+            <a:ext cx="3813866" cy="2677656"/>
           </a:xfrm>
           <a:prstGeom prst="rect">
             <a:avLst/>
@@ -3629,14 +4071,43 @@
                   <a:schemeClr val="bg1"/>
                 </a:solidFill>
               </a:rPr>
-              <a:t>Tile ecosystem is used as a locator system, for instance, allows users to track down valuables such as their wallets.</a:t>
-            </a:r>
-            <a:endParaRPr lang="en-CY" dirty="0">
+              <a:t>Dementia is a term used to describe a set of symptoms linked with progressive neurological (brain) disorders and may include memory loss, difficulties with thinking, problem-solving, or language. </a:t>
+            </a:r>
+          </a:p>
+          <a:p>
+            <a:endParaRPr lang="en-US" sz="1200" dirty="0">
               <a:solidFill>
                 <a:schemeClr val="bg1"/>
               </a:solidFill>
             </a:endParaRPr>
           </a:p>
+          <a:p>
+            <a:r>
+              <a:rPr lang="en-US" sz="1200" dirty="0">
+                <a:solidFill>
+                  <a:schemeClr val="bg1"/>
+                </a:solidFill>
+              </a:rPr>
+              <a:t>Tile ecosystem is used as a locator system, for instance, allows users to track down valuables such as their wallets.</a:t>
+            </a:r>
+          </a:p>
+          <a:p>
+            <a:endParaRPr lang="en-US" sz="1200" dirty="0">
+              <a:solidFill>
+                <a:schemeClr val="bg1"/>
+              </a:solidFill>
+            </a:endParaRPr>
+          </a:p>
+          <a:p>
+            <a:r>
+              <a:rPr lang="en-US" sz="1200" dirty="0">
+                <a:solidFill>
+                  <a:schemeClr val="bg1"/>
+                </a:solidFill>
+              </a:rPr>
+              <a:t>Hanging objects from door frames that clatter together when the patient comes through the door or placing pressure pads beneath doormats that sound an alert when the patient steps on the doormat are two other classic devices that caregivers may employ to warn themselves that their patient is moving.</a:t>
+            </a:r>
+          </a:p>
         </p:txBody>
       </p:sp>
       <p:sp>
@@ -3653,8 +4124,8 @@
         </p:nvSpPr>
         <p:spPr>
           <a:xfrm>
-            <a:off x="8371920" y="1384993"/>
-            <a:ext cx="3757920" cy="276999"/>
+            <a:off x="8371921" y="1191037"/>
+            <a:ext cx="3757920" cy="646331"/>
           </a:xfrm>
           <a:prstGeom prst="rect">
             <a:avLst/>
@@ -3684,9 +4155,9 @@
                   <a:schemeClr val="bg1"/>
                 </a:solidFill>
               </a:rPr>
-              <a:t>Design for the walking aid system</a:t>
-            </a:r>
-            <a:endParaRPr lang="en-CY" dirty="0">
+              <a:t>Both devices for the system are being done by 3D printing. The one on the left is the walking aid device and the one on the right is the wearable device.</a:t>
+            </a:r>
+            <a:endParaRPr lang="en-CY" sz="1905" dirty="0">
               <a:solidFill>
                 <a:schemeClr val="bg1"/>
               </a:solidFill>
@@ -3708,8 +4179,8 @@
         </p:nvSpPr>
         <p:spPr>
           <a:xfrm>
-            <a:off x="4197936" y="3411321"/>
-            <a:ext cx="3813864" cy="276999"/>
+            <a:off x="4195174" y="4241811"/>
+            <a:ext cx="3813864" cy="1754326"/>
           </a:xfrm>
           <a:prstGeom prst="rect">
             <a:avLst/>
@@ -3739,14 +4210,58 @@
                   <a:schemeClr val="bg1"/>
                 </a:solidFill>
               </a:rPr>
-              <a:t>The methodology we used.</a:t>
-            </a:r>
-            <a:endParaRPr lang="en-CY" dirty="0">
+              <a:t>We used an agile-based development methodology, after being small group members, in more detail, we held frequent intervals, every week, due to other university work. </a:t>
+            </a:r>
+          </a:p>
+          <a:p>
+            <a:endParaRPr lang="en-US" sz="1200" dirty="0">
               <a:solidFill>
                 <a:schemeClr val="bg1"/>
               </a:solidFill>
             </a:endParaRPr>
           </a:p>
+          <a:p>
+            <a:r>
+              <a:rPr lang="en-US" sz="1200" dirty="0">
+                <a:solidFill>
+                  <a:schemeClr val="bg1"/>
+                </a:solidFill>
+              </a:rPr>
+              <a:t>Our hardware is based on the </a:t>
+            </a:r>
+            <a:r>
+              <a:rPr lang="en-US" sz="1200" dirty="0" err="1">
+                <a:solidFill>
+                  <a:schemeClr val="bg1"/>
+                </a:solidFill>
+              </a:rPr>
+              <a:t>TinyPico</a:t>
+            </a:r>
+            <a:r>
+              <a:rPr lang="en-US" sz="1200" dirty="0">
+                <a:solidFill>
+                  <a:schemeClr val="bg1"/>
+                </a:solidFill>
+              </a:rPr>
+              <a:t> implementation of the </a:t>
+            </a:r>
+            <a:r>
+              <a:rPr lang="en-US" sz="1200" dirty="0" err="1">
+                <a:solidFill>
+                  <a:schemeClr val="bg1"/>
+                </a:solidFill>
+              </a:rPr>
+              <a:t>Espressif</a:t>
+            </a:r>
+            <a:r>
+              <a:rPr lang="en-US" sz="1200" dirty="0">
+                <a:solidFill>
+                  <a:schemeClr val="bg1"/>
+                </a:solidFill>
+              </a:rPr>
+              <a:t> Systems ESP32 devices. For the movement detection, we used accelerometers specifically the ADXL345. </a:t>
+            </a:r>
+          </a:p>
         </p:txBody>
       </p:sp>
       <p:sp>
@@ -3763,7 +4278,7 @@
         </p:nvSpPr>
         <p:spPr>
           <a:xfrm>
-            <a:off x="8371922" y="4021872"/>
+            <a:off x="8371922" y="4816207"/>
             <a:ext cx="3757919" cy="276999"/>
           </a:xfrm>
           <a:prstGeom prst="rect">
@@ -3796,7 +4311,7 @@
               </a:rPr>
               <a:t>The Conclusion.</a:t>
             </a:r>
-            <a:endParaRPr lang="en-CY" dirty="0">
+            <a:endParaRPr lang="en-CY" sz="1905" dirty="0">
               <a:solidFill>
                 <a:schemeClr val="bg1"/>
               </a:solidFill>
@@ -3818,7 +4333,7 @@
         </p:nvSpPr>
         <p:spPr>
           <a:xfrm>
-            <a:off x="8371920" y="5150259"/>
+            <a:off x="8371921" y="5944594"/>
             <a:ext cx="3757919" cy="276999"/>
           </a:xfrm>
           <a:prstGeom prst="rect">
@@ -3851,7 +4366,7 @@
               </a:rPr>
               <a:t>Add References.</a:t>
             </a:r>
-            <a:endParaRPr lang="en-CY" dirty="0">
+            <a:endParaRPr lang="en-CY" sz="1905" dirty="0">
               <a:solidFill>
                 <a:schemeClr val="bg1"/>
               </a:solidFill>
@@ -3873,7 +4388,7 @@
         </p:nvSpPr>
         <p:spPr>
           <a:xfrm>
-            <a:off x="62159" y="1015663"/>
+            <a:off x="62160" y="825493"/>
             <a:ext cx="3817347" cy="369332"/>
           </a:xfrm>
           <a:prstGeom prst="rect">
@@ -3889,14 +4404,14 @@
           <a:p>
             <a:pPr algn="ctr"/>
             <a:r>
-              <a:rPr lang="en-US" sz="1800" dirty="0">
+              <a:rPr lang="en-US" dirty="0">
                 <a:solidFill>
                   <a:schemeClr val="bg1"/>
                 </a:solidFill>
               </a:rPr>
               <a:t>ABSTRACT</a:t>
             </a:r>
-            <a:endParaRPr lang="en-CY" dirty="0"/>
+            <a:endParaRPr lang="en-CY" sz="1905" dirty="0"/>
           </a:p>
         </p:txBody>
       </p:sp>
@@ -3914,8 +4429,8 @@
         </p:nvSpPr>
         <p:spPr>
           <a:xfrm>
-            <a:off x="62159" y="3054489"/>
-            <a:ext cx="3817348" cy="369332"/>
+            <a:off x="62159" y="2420980"/>
+            <a:ext cx="3817348" cy="385490"/>
           </a:xfrm>
           <a:prstGeom prst="rect">
             <a:avLst/>
@@ -3930,14 +4445,14 @@
           <a:p>
             <a:pPr algn="ctr"/>
             <a:r>
-              <a:rPr lang="en-US" dirty="0">
+              <a:rPr lang="en-US" sz="1905" dirty="0">
                 <a:solidFill>
                   <a:schemeClr val="bg1"/>
                 </a:solidFill>
               </a:rPr>
               <a:t>INTRODUCTION</a:t>
             </a:r>
-            <a:endParaRPr lang="en-CY" dirty="0"/>
+            <a:endParaRPr lang="en-CY" sz="1905" dirty="0"/>
           </a:p>
         </p:txBody>
       </p:sp>
@@ -3955,7 +4470,7 @@
         </p:nvSpPr>
         <p:spPr>
           <a:xfrm>
-            <a:off x="4191830" y="3036810"/>
+            <a:off x="4189068" y="3872479"/>
             <a:ext cx="3813864" cy="369332"/>
           </a:xfrm>
           <a:prstGeom prst="rect">
@@ -3971,14 +4486,14 @@
           <a:p>
             <a:pPr algn="ctr"/>
             <a:r>
-              <a:rPr lang="en-US" sz="1800" dirty="0">
+              <a:rPr lang="en-US" dirty="0">
                 <a:solidFill>
                   <a:schemeClr val="bg1"/>
                 </a:solidFill>
               </a:rPr>
               <a:t>METHODOLOGY</a:t>
             </a:r>
-            <a:endParaRPr lang="en-CY" dirty="0"/>
+            <a:endParaRPr lang="en-CY" sz="1905" dirty="0"/>
           </a:p>
         </p:txBody>
       </p:sp>
@@ -3996,7 +4511,7 @@
         </p:nvSpPr>
         <p:spPr>
           <a:xfrm>
-            <a:off x="8371921" y="1015661"/>
+            <a:off x="8371922" y="821706"/>
             <a:ext cx="3757920" cy="369332"/>
           </a:xfrm>
           <a:prstGeom prst="rect">
@@ -4012,14 +4527,14 @@
           <a:p>
             <a:pPr algn="ctr"/>
             <a:r>
-              <a:rPr lang="en-US" sz="1800" dirty="0">
+              <a:rPr lang="en-US" dirty="0">
                 <a:solidFill>
                   <a:schemeClr val="bg1"/>
                 </a:solidFill>
               </a:rPr>
-              <a:t>DESIGN</a:t>
-            </a:r>
-            <a:endParaRPr lang="en-CY" dirty="0"/>
+              <a:t>DESIGNS</a:t>
+            </a:r>
+            <a:endParaRPr lang="en-CY" sz="1905" dirty="0"/>
           </a:p>
         </p:txBody>
       </p:sp>
@@ -4037,7 +4552,7 @@
         </p:nvSpPr>
         <p:spPr>
           <a:xfrm>
-            <a:off x="8371921" y="3652524"/>
+            <a:off x="8371921" y="4446858"/>
             <a:ext cx="3757919" cy="369332"/>
           </a:xfrm>
           <a:prstGeom prst="rect">
@@ -4053,14 +4568,14 @@
           <a:p>
             <a:pPr algn="ctr"/>
             <a:r>
-              <a:rPr lang="en-US" sz="1800" dirty="0">
+              <a:rPr lang="en-US" dirty="0">
                 <a:solidFill>
                   <a:schemeClr val="bg1"/>
                 </a:solidFill>
               </a:rPr>
               <a:t>CONCLUSION</a:t>
             </a:r>
-            <a:endParaRPr lang="en-CY" dirty="0"/>
+            <a:endParaRPr lang="en-CY" sz="1905" dirty="0"/>
           </a:p>
         </p:txBody>
       </p:sp>
@@ -4078,7 +4593,7 @@
         </p:nvSpPr>
         <p:spPr>
           <a:xfrm>
-            <a:off x="8371921" y="4748946"/>
+            <a:off x="8371921" y="5543281"/>
             <a:ext cx="3746098" cy="369332"/>
           </a:xfrm>
           <a:prstGeom prst="rect">
@@ -4094,14 +4609,14 @@
           <a:p>
             <a:pPr algn="ctr"/>
             <a:r>
-              <a:rPr lang="en-US" sz="1800" dirty="0">
+              <a:rPr lang="en-US" dirty="0">
                 <a:solidFill>
                   <a:schemeClr val="bg1"/>
                 </a:solidFill>
               </a:rPr>
               <a:t>REFERENCES</a:t>
             </a:r>
-            <a:endParaRPr lang="en-CY" dirty="0"/>
+            <a:endParaRPr lang="en-CY" sz="1905" dirty="0"/>
           </a:p>
         </p:txBody>
       </p:sp>
@@ -4120,7 +4635,7 @@
           <p:nvPr/>
         </p:nvPicPr>
         <p:blipFill>
-          <a:blip r:embed="rId2">
+          <a:blip r:embed="rId3">
             <a:extLst>
               <a:ext uri="{28A0092B-C50C-407E-A947-70E740481C1C}">
                 <a14:useLocalDpi xmlns:a14="http://schemas.microsoft.com/office/drawing/2010/main" val="0"/>
@@ -4133,8 +4648,8 @@
         </p:blipFill>
         <p:spPr>
           <a:xfrm>
-            <a:off x="8347968" y="1692728"/>
-            <a:ext cx="1601528" cy="2134137"/>
+            <a:off x="8173944" y="1758397"/>
+            <a:ext cx="1515000" cy="2018833"/>
           </a:xfrm>
           <a:prstGeom prst="rect">
             <a:avLst/>
@@ -4155,7 +4670,7 @@
         </p:nvSpPr>
         <p:spPr>
           <a:xfrm>
-            <a:off x="4197937" y="1015661"/>
+            <a:off x="4197938" y="825491"/>
             <a:ext cx="3813865" cy="369332"/>
           </a:xfrm>
           <a:prstGeom prst="rect">
@@ -4171,17 +4686,53 @@
           <a:p>
             <a:pPr algn="ctr"/>
             <a:r>
-              <a:rPr lang="en-US" sz="1800" dirty="0">
+              <a:rPr lang="en-US" dirty="0">
                 <a:solidFill>
                   <a:schemeClr val="bg1"/>
                 </a:solidFill>
               </a:rPr>
               <a:t>BACKGROUND WORK</a:t>
             </a:r>
-            <a:endParaRPr lang="en-CY" dirty="0"/>
-          </a:p>
-        </p:txBody>
-      </p:sp>
+            <a:endParaRPr lang="en-CY" sz="1905" dirty="0"/>
+          </a:p>
+        </p:txBody>
+      </p:sp>
+      <p:pic>
+        <p:nvPicPr>
+          <p:cNvPr id="12" name="Picture 11" descr="Logo&#10;&#10;Description automatically generated">
+            <a:extLst>
+              <a:ext uri="{FF2B5EF4-FFF2-40B4-BE49-F238E27FC236}">
+                <a16:creationId xmlns:a16="http://schemas.microsoft.com/office/drawing/2014/main" id="{E244036F-133D-41DB-B29F-5D24A4CF7508}"/>
+              </a:ext>
+            </a:extLst>
+          </p:cNvPr>
+          <p:cNvPicPr>
+            <a:picLocks noChangeAspect="1"/>
+          </p:cNvPicPr>
+          <p:nvPr/>
+        </p:nvPicPr>
+        <p:blipFill>
+          <a:blip r:embed="rId4">
+            <a:extLst>
+              <a:ext uri="{28A0092B-C50C-407E-A947-70E740481C1C}">
+                <a14:useLocalDpi xmlns:a14="http://schemas.microsoft.com/office/drawing/2010/main" val="0"/>
+              </a:ext>
+            </a:extLst>
+          </a:blip>
+          <a:stretch>
+            <a:fillRect/>
+          </a:stretch>
+        </p:blipFill>
+        <p:spPr>
+          <a:xfrm>
+            <a:off x="62159" y="66753"/>
+            <a:ext cx="1056428" cy="722359"/>
+          </a:xfrm>
+          <a:prstGeom prst="rect">
+            <a:avLst/>
+          </a:prstGeom>
+        </p:spPr>
+      </p:pic>
     </p:spTree>
     <p:extLst>
       <p:ext uri="{BB962C8B-B14F-4D97-AF65-F5344CB8AC3E}">
@@ -4488,4 +5039,299 @@
     </a:ext>
   </a:extLst>
 </a:theme>
+</file>
+
+<file path=ppt/theme/theme2.xml><?xml version="1.0" encoding="utf-8"?>
+<a:theme xmlns:a="http://schemas.openxmlformats.org/drawingml/2006/main" name="Office Theme">
+  <a:themeElements>
+    <a:clrScheme name="Office">
+      <a:dk1>
+        <a:sysClr val="windowText" lastClr="000000"/>
+      </a:dk1>
+      <a:lt1>
+        <a:sysClr val="window" lastClr="FFFFFF"/>
+      </a:lt1>
+      <a:dk2>
+        <a:srgbClr val="44546A"/>
+      </a:dk2>
+      <a:lt2>
+        <a:srgbClr val="E7E6E6"/>
+      </a:lt2>
+      <a:accent1>
+        <a:srgbClr val="4472C4"/>
+      </a:accent1>
+      <a:accent2>
+        <a:srgbClr val="ED7D31"/>
+      </a:accent2>
+      <a:accent3>
+        <a:srgbClr val="A5A5A5"/>
+      </a:accent3>
+      <a:accent4>
+        <a:srgbClr val="FFC000"/>
+      </a:accent4>
+      <a:accent5>
+        <a:srgbClr val="5B9BD5"/>
+      </a:accent5>
+      <a:accent6>
+        <a:srgbClr val="70AD47"/>
+      </a:accent6>
+      <a:hlink>
+        <a:srgbClr val="0563C1"/>
+      </a:hlink>
+      <a:folHlink>
+        <a:srgbClr val="954F72"/>
+      </a:folHlink>
+    </a:clrScheme>
+    <a:fontScheme name="Office">
+      <a:majorFont>
+        <a:latin typeface="Calibri Light" panose="020F0302020204030204"/>
+        <a:ea typeface=""/>
+        <a:cs typeface=""/>
+        <a:font script="Jpan" typeface="游ゴシック Light"/>
+        <a:font script="Hang" typeface="맑은 고딕"/>
+        <a:font script="Hans" typeface="等线 Light"/>
+        <a:font script="Hant" typeface="新細明體"/>
+        <a:font script="Arab" typeface="Times New Roman"/>
+        <a:font script="Hebr" typeface="Times New Roman"/>
+        <a:font script="Thai" typeface="Angsana New"/>
+        <a:font script="Ethi" typeface="Nyala"/>
+        <a:font script="Beng" typeface="Vrinda"/>
+        <a:font script="Gujr" typeface="Shruti"/>
+        <a:font script="Khmr" typeface="MoolBoran"/>
+        <a:font script="Knda" typeface="Tunga"/>
+        <a:font script="Guru" typeface="Raavi"/>
+        <a:font script="Cans" typeface="Euphemia"/>
+        <a:font script="Cher" typeface="Plantagenet Cherokee"/>
+        <a:font script="Yiii" typeface="Microsoft Yi Baiti"/>
+        <a:font script="Tibt" typeface="Microsoft Himalaya"/>
+        <a:font script="Thaa" typeface="MV Boli"/>
+        <a:font script="Deva" typeface="Mangal"/>
+        <a:font script="Telu" typeface="Gautami"/>
+        <a:font script="Taml" typeface="Latha"/>
+        <a:font script="Syrc" typeface="Estrangelo Edessa"/>
+        <a:font script="Orya" typeface="Kalinga"/>
+        <a:font script="Mlym" typeface="Kartika"/>
+        <a:font script="Laoo" typeface="DokChampa"/>
+        <a:font script="Sinh" typeface="Iskoola Pota"/>
+        <a:font script="Mong" typeface="Mongolian Baiti"/>
+        <a:font script="Viet" typeface="Times New Roman"/>
+        <a:font script="Uigh" typeface="Microsoft Uighur"/>
+        <a:font script="Geor" typeface="Sylfaen"/>
+        <a:font script="Armn" typeface="Arial"/>
+        <a:font script="Bugi" typeface="Leelawadee UI"/>
+        <a:font script="Bopo" typeface="Microsoft JhengHei"/>
+        <a:font script="Java" typeface="Javanese Text"/>
+        <a:font script="Lisu" typeface="Segoe UI"/>
+        <a:font script="Mymr" typeface="Myanmar Text"/>
+        <a:font script="Nkoo" typeface="Ebrima"/>
+        <a:font script="Olck" typeface="Nirmala UI"/>
+        <a:font script="Osma" typeface="Ebrima"/>
+        <a:font script="Phag" typeface="Phagspa"/>
+        <a:font script="Syrn" typeface="Estrangelo Edessa"/>
+        <a:font script="Syrj" typeface="Estrangelo Edessa"/>
+        <a:font script="Syre" typeface="Estrangelo Edessa"/>
+        <a:font script="Sora" typeface="Nirmala UI"/>
+        <a:font script="Tale" typeface="Microsoft Tai Le"/>
+        <a:font script="Talu" typeface="Microsoft New Tai Lue"/>
+        <a:font script="Tfng" typeface="Ebrima"/>
+      </a:majorFont>
+      <a:minorFont>
+        <a:latin typeface="Calibri" panose="020F0502020204030204"/>
+        <a:ea typeface=""/>
+        <a:cs typeface=""/>
+        <a:font script="Jpan" typeface="游ゴシック"/>
+        <a:font script="Hang" typeface="맑은 고딕"/>
+        <a:font script="Hans" typeface="等线"/>
+        <a:font script="Hant" typeface="新細明體"/>
+        <a:font script="Arab" typeface="Arial"/>
+        <a:font script="Hebr" typeface="Arial"/>
+        <a:font script="Thai" typeface="Cordia New"/>
+        <a:font script="Ethi" typeface="Nyala"/>
+        <a:font script="Beng" typeface="Vrinda"/>
+        <a:font script="Gujr" typeface="Shruti"/>
+        <a:font script="Khmr" typeface="DaunPenh"/>
+        <a:font script="Knda" typeface="Tunga"/>
+        <a:font script="Guru" typeface="Raavi"/>
+        <a:font script="Cans" typeface="Euphemia"/>
+        <a:font script="Cher" typeface="Plantagenet Cherokee"/>
+        <a:font script="Yiii" typeface="Microsoft Yi Baiti"/>
+        <a:font script="Tibt" typeface="Microsoft Himalaya"/>
+        <a:font script="Thaa" typeface="MV Boli"/>
+        <a:font script="Deva" typeface="Mangal"/>
+        <a:font script="Telu" typeface="Gautami"/>
+        <a:font script="Taml" typeface="Latha"/>
+        <a:font script="Syrc" typeface="Estrangelo Edessa"/>
+        <a:font script="Orya" typeface="Kalinga"/>
+        <a:font script="Mlym" typeface="Kartika"/>
+        <a:font script="Laoo" typeface="DokChampa"/>
+        <a:font script="Sinh" typeface="Iskoola Pota"/>
+        <a:font script="Mong" typeface="Mongolian Baiti"/>
+        <a:font script="Viet" typeface="Arial"/>
+        <a:font script="Uigh" typeface="Microsoft Uighur"/>
+        <a:font script="Geor" typeface="Sylfaen"/>
+        <a:font script="Armn" typeface="Arial"/>
+        <a:font script="Bugi" typeface="Leelawadee UI"/>
+        <a:font script="Bopo" typeface="Microsoft JhengHei"/>
+        <a:font script="Java" typeface="Javanese Text"/>
+        <a:font script="Lisu" typeface="Segoe UI"/>
+        <a:font script="Mymr" typeface="Myanmar Text"/>
+        <a:font script="Nkoo" typeface="Ebrima"/>
+        <a:font script="Olck" typeface="Nirmala UI"/>
+        <a:font script="Osma" typeface="Ebrima"/>
+        <a:font script="Phag" typeface="Phagspa"/>
+        <a:font script="Syrn" typeface="Estrangelo Edessa"/>
+        <a:font script="Syrj" typeface="Estrangelo Edessa"/>
+        <a:font script="Syre" typeface="Estrangelo Edessa"/>
+        <a:font script="Sora" typeface="Nirmala UI"/>
+        <a:font script="Tale" typeface="Microsoft Tai Le"/>
+        <a:font script="Talu" typeface="Microsoft New Tai Lue"/>
+        <a:font script="Tfng" typeface="Ebrima"/>
+      </a:minorFont>
+    </a:fontScheme>
+    <a:fmtScheme name="Office">
+      <a:fillStyleLst>
+        <a:solidFill>
+          <a:schemeClr val="phClr"/>
+        </a:solidFill>
+        <a:gradFill rotWithShape="1">
+          <a:gsLst>
+            <a:gs pos="0">
+              <a:schemeClr val="phClr">
+                <a:lumMod val="110000"/>
+                <a:satMod val="105000"/>
+                <a:tint val="67000"/>
+              </a:schemeClr>
+            </a:gs>
+            <a:gs pos="50000">
+              <a:schemeClr val="phClr">
+                <a:lumMod val="105000"/>
+                <a:satMod val="103000"/>
+                <a:tint val="73000"/>
+              </a:schemeClr>
+            </a:gs>
+            <a:gs pos="100000">
+              <a:schemeClr val="phClr">
+                <a:lumMod val="105000"/>
+                <a:satMod val="109000"/>
+                <a:tint val="81000"/>
+              </a:schemeClr>
+            </a:gs>
+          </a:gsLst>
+          <a:lin ang="5400000" scaled="0"/>
+        </a:gradFill>
+        <a:gradFill rotWithShape="1">
+          <a:gsLst>
+            <a:gs pos="0">
+              <a:schemeClr val="phClr">
+                <a:satMod val="103000"/>
+                <a:lumMod val="102000"/>
+                <a:tint val="94000"/>
+              </a:schemeClr>
+            </a:gs>
+            <a:gs pos="50000">
+              <a:schemeClr val="phClr">
+                <a:satMod val="110000"/>
+                <a:lumMod val="100000"/>
+                <a:shade val="100000"/>
+              </a:schemeClr>
+            </a:gs>
+            <a:gs pos="100000">
+              <a:schemeClr val="phClr">
+                <a:lumMod val="99000"/>
+                <a:satMod val="120000"/>
+                <a:shade val="78000"/>
+              </a:schemeClr>
+            </a:gs>
+          </a:gsLst>
+          <a:lin ang="5400000" scaled="0"/>
+        </a:gradFill>
+      </a:fillStyleLst>
+      <a:lnStyleLst>
+        <a:ln w="6350" cap="flat" cmpd="sng" algn="ctr">
+          <a:solidFill>
+            <a:schemeClr val="phClr"/>
+          </a:solidFill>
+          <a:prstDash val="solid"/>
+          <a:miter lim="800000"/>
+        </a:ln>
+        <a:ln w="12700" cap="flat" cmpd="sng" algn="ctr">
+          <a:solidFill>
+            <a:schemeClr val="phClr"/>
+          </a:solidFill>
+          <a:prstDash val="solid"/>
+          <a:miter lim="800000"/>
+        </a:ln>
+        <a:ln w="19050" cap="flat" cmpd="sng" algn="ctr">
+          <a:solidFill>
+            <a:schemeClr val="phClr"/>
+          </a:solidFill>
+          <a:prstDash val="solid"/>
+          <a:miter lim="800000"/>
+        </a:ln>
+      </a:lnStyleLst>
+      <a:effectStyleLst>
+        <a:effectStyle>
+          <a:effectLst/>
+        </a:effectStyle>
+        <a:effectStyle>
+          <a:effectLst/>
+        </a:effectStyle>
+        <a:effectStyle>
+          <a:effectLst>
+            <a:outerShdw blurRad="57150" dist="19050" dir="5400000" algn="ctr" rotWithShape="0">
+              <a:srgbClr val="000000">
+                <a:alpha val="63000"/>
+              </a:srgbClr>
+            </a:outerShdw>
+          </a:effectLst>
+        </a:effectStyle>
+      </a:effectStyleLst>
+      <a:bgFillStyleLst>
+        <a:solidFill>
+          <a:schemeClr val="phClr"/>
+        </a:solidFill>
+        <a:solidFill>
+          <a:schemeClr val="phClr">
+            <a:tint val="95000"/>
+            <a:satMod val="170000"/>
+          </a:schemeClr>
+        </a:solidFill>
+        <a:gradFill rotWithShape="1">
+          <a:gsLst>
+            <a:gs pos="0">
+              <a:schemeClr val="phClr">
+                <a:tint val="93000"/>
+                <a:satMod val="150000"/>
+                <a:shade val="98000"/>
+                <a:lumMod val="102000"/>
+              </a:schemeClr>
+            </a:gs>
+            <a:gs pos="50000">
+              <a:schemeClr val="phClr">
+                <a:tint val="98000"/>
+                <a:satMod val="130000"/>
+                <a:shade val="90000"/>
+                <a:lumMod val="103000"/>
+              </a:schemeClr>
+            </a:gs>
+            <a:gs pos="100000">
+              <a:schemeClr val="phClr">
+                <a:shade val="63000"/>
+                <a:satMod val="120000"/>
+              </a:schemeClr>
+            </a:gs>
+          </a:gsLst>
+          <a:lin ang="5400000" scaled="0"/>
+        </a:gradFill>
+      </a:bgFillStyleLst>
+    </a:fmtScheme>
+  </a:themeElements>
+  <a:objectDefaults/>
+  <a:extraClrSchemeLst/>
+  <a:extLst>
+    <a:ext uri="{05A4C25C-085E-4340-85A3-A5531E510DB2}">
+      <thm15:themeFamily xmlns:thm15="http://schemas.microsoft.com/office/thememl/2012/main" name="Office Theme" id="{62F939B6-93AF-4DB8-9C6B-D6C7DFDC589F}" vid="{4A3C46E8-61CC-4603-A589-7422A47A8E4A}"/>
+    </a:ext>
+  </a:extLst>
+</a:theme>
 </file>
</xml_diff>